<commit_message>
added slides related to the Gamma Challenge
</commit_message>
<xml_diff>
--- a/Lecture/ws17-18/GammaChallenge_TU_Darmstadt_English.pptx
+++ b/Lecture/ws17-18/GammaChallenge_TU_Darmstadt_English.pptx
@@ -9,8 +9,8 @@
   </p:notesMasterIdLst>
   <p:sldIdLst>
     <p:sldId id="263" r:id="rId2"/>
-    <p:sldId id="264" r:id="rId3"/>
-    <p:sldId id="265" r:id="rId4"/>
+    <p:sldId id="265" r:id="rId3"/>
+    <p:sldId id="264" r:id="rId4"/>
     <p:sldId id="266" r:id="rId5"/>
     <p:sldId id="267" r:id="rId6"/>
     <p:sldId id="268" r:id="rId7"/>
@@ -316,6 +316,11 @@
       </a:defRPr>
     </a:lvl9pPr>
   </p:defaultTextStyle>
+  <p:extLst>
+    <p:ext uri="{EFAFB233-063F-42B5-8137-9DF3F51BA10A}">
+      <p15:sldGuideLst xmlns:p15="http://schemas.microsoft.com/office/powerpoint/2012/main"/>
+    </p:ext>
+  </p:extLst>
 </p:presentation>
 </file>
 
@@ -4071,842 +4076,6 @@
       </p:grpSpPr>
       <p:sp>
         <p:nvSpPr>
-          <p:cNvPr id="236" name="Let the games begin!"/>
-          <p:cNvSpPr txBox="1">
-            <a:spLocks noGrp="1"/>
-          </p:cNvSpPr>
-          <p:nvPr>
-            <p:ph type="title"/>
-          </p:nvPr>
-        </p:nvSpPr>
-        <p:spPr>
-          <a:prstGeom prst="rect">
-            <a:avLst/>
-          </a:prstGeom>
-        </p:spPr>
-        <p:txBody>
-          <a:bodyPr/>
-          <a:lstStyle/>
-          <a:p>
-            <a:r>
-              <a:t>Let the games begin!</a:t>
-            </a:r>
-          </a:p>
-        </p:txBody>
-      </p:sp>
-      <p:sp>
-        <p:nvSpPr>
-          <p:cNvPr id="237" name="Slide Number"/>
-          <p:cNvSpPr txBox="1">
-            <a:spLocks noGrp="1"/>
-          </p:cNvSpPr>
-          <p:nvPr>
-            <p:ph type="sldNum" sz="quarter" idx="2"/>
-          </p:nvPr>
-        </p:nvSpPr>
-        <p:spPr>
-          <a:xfrm>
-            <a:off x="23381664" y="12863170"/>
-            <a:ext cx="243232" cy="361900"/>
-          </a:xfrm>
-          <a:prstGeom prst="rect">
-            <a:avLst/>
-          </a:prstGeom>
-          <a:extLst>
-            <a:ext uri="{C572A759-6A51-4108-AA02-DFA0A04FC94B}">
-              <ma14:wrappingTextBoxFlag xmlns:ma14="http://schemas.microsoft.com/office/mac/drawingml/2011/main" val="1"/>
-            </a:ext>
-          </a:extLst>
-        </p:spPr>
-        <p:txBody>
-          <a:bodyPr/>
-          <a:lstStyle/>
-          <a:p>
-            <a:fld id="{86CB4B4D-7CA3-9044-876B-883B54F8677D}" type="slidenum">
-              <a:t>2</a:t>
-            </a:fld>
-            <a:endParaRPr/>
-          </a:p>
-        </p:txBody>
-      </p:sp>
-      <p:pic>
-        <p:nvPicPr>
-          <p:cNvPr id="238" name="team.png" descr="team.png"/>
-          <p:cNvPicPr>
-            <a:picLocks noChangeAspect="1"/>
-          </p:cNvPicPr>
-          <p:nvPr/>
-        </p:nvPicPr>
-        <p:blipFill>
-          <a:blip r:embed="rId2">
-            <a:extLst/>
-          </a:blip>
-          <a:stretch>
-            <a:fillRect/>
-          </a:stretch>
-        </p:blipFill>
-        <p:spPr>
-          <a:xfrm>
-            <a:off x="1766821" y="4279391"/>
-            <a:ext cx="3556001" cy="3539911"/>
-          </a:xfrm>
-          <a:prstGeom prst="rect">
-            <a:avLst/>
-          </a:prstGeom>
-          <a:ln w="12700">
-            <a:miter lim="400000"/>
-          </a:ln>
-        </p:spPr>
-      </p:pic>
-      <p:sp>
-        <p:nvSpPr>
-          <p:cNvPr id="239" name="Process"/>
-          <p:cNvSpPr txBox="1"/>
-          <p:nvPr/>
-        </p:nvSpPr>
-        <p:spPr>
-          <a:xfrm>
-            <a:off x="6704674" y="8101076"/>
-            <a:ext cx="4987528" cy="535433"/>
-          </a:xfrm>
-          <a:prstGeom prst="rect">
-            <a:avLst/>
-          </a:prstGeom>
-          <a:ln w="12700">
-            <a:miter lim="400000"/>
-          </a:ln>
-          <a:extLst>
-            <a:ext uri="{C572A759-6A51-4108-AA02-DFA0A04FC94B}">
-              <ma14:wrappingTextBoxFlag xmlns:ma14="http://schemas.microsoft.com/office/mac/drawingml/2011/main" val="1"/>
-            </a:ext>
-          </a:extLst>
-        </p:spPr>
-        <p:txBody>
-          <a:bodyPr lIns="50800" tIns="50800" rIns="50800" bIns="50800">
-            <a:spAutoFit/>
-          </a:bodyPr>
-          <a:lstStyle>
-            <a:lvl1pPr defTabSz="12700">
-              <a:tabLst>
-                <a:tab pos="355600" algn="l"/>
-                <a:tab pos="711200" algn="l"/>
-                <a:tab pos="1066800" algn="l"/>
-                <a:tab pos="1422400" algn="l"/>
-                <a:tab pos="1778000" algn="l"/>
-                <a:tab pos="2133600" algn="l"/>
-                <a:tab pos="2489200" algn="l"/>
-                <a:tab pos="2844800" algn="l"/>
-                <a:tab pos="3200400" algn="l"/>
-                <a:tab pos="3556000" algn="l"/>
-                <a:tab pos="3911600" algn="l"/>
-                <a:tab pos="4267200" algn="l"/>
-              </a:tabLst>
-              <a:defRPr>
-                <a:solidFill>
-                  <a:srgbClr val="00CB9F"/>
-                </a:solidFill>
-                <a:latin typeface="+mn-lt"/>
-                <a:ea typeface="+mn-ea"/>
-                <a:cs typeface="+mn-cs"/>
-                <a:sym typeface="Ubuntu"/>
-              </a:defRPr>
-            </a:lvl1pPr>
-          </a:lstStyle>
-          <a:p>
-            <a:r>
-              <a:t>Analyse</a:t>
-            </a:r>
-          </a:p>
-        </p:txBody>
-      </p:sp>
-      <p:sp>
-        <p:nvSpPr>
-          <p:cNvPr id="240" name="Process"/>
-          <p:cNvSpPr txBox="1"/>
-          <p:nvPr/>
-        </p:nvSpPr>
-        <p:spPr>
-          <a:xfrm>
-            <a:off x="12358291" y="8101076"/>
-            <a:ext cx="4987527" cy="535433"/>
-          </a:xfrm>
-          <a:prstGeom prst="rect">
-            <a:avLst/>
-          </a:prstGeom>
-          <a:ln w="12700">
-            <a:miter lim="400000"/>
-          </a:ln>
-          <a:extLst>
-            <a:ext uri="{C572A759-6A51-4108-AA02-DFA0A04FC94B}">
-              <ma14:wrappingTextBoxFlag xmlns:ma14="http://schemas.microsoft.com/office/mac/drawingml/2011/main" val="1"/>
-            </a:ext>
-          </a:extLst>
-        </p:spPr>
-        <p:txBody>
-          <a:bodyPr lIns="50800" tIns="50800" rIns="50800" bIns="50800">
-            <a:spAutoFit/>
-          </a:bodyPr>
-          <a:lstStyle>
-            <a:lvl1pPr defTabSz="12700">
-              <a:tabLst>
-                <a:tab pos="355600" algn="l"/>
-                <a:tab pos="711200" algn="l"/>
-                <a:tab pos="1066800" algn="l"/>
-                <a:tab pos="1422400" algn="l"/>
-                <a:tab pos="1778000" algn="l"/>
-                <a:tab pos="2133600" algn="l"/>
-                <a:tab pos="2489200" algn="l"/>
-                <a:tab pos="2844800" algn="l"/>
-                <a:tab pos="3200400" algn="l"/>
-                <a:tab pos="3556000" algn="l"/>
-                <a:tab pos="3911600" algn="l"/>
-                <a:tab pos="4267200" algn="l"/>
-              </a:tabLst>
-              <a:defRPr>
-                <a:solidFill>
-                  <a:srgbClr val="00CB9F"/>
-                </a:solidFill>
-                <a:latin typeface="+mn-lt"/>
-                <a:ea typeface="+mn-ea"/>
-                <a:cs typeface="+mn-cs"/>
-                <a:sym typeface="Ubuntu"/>
-              </a:defRPr>
-            </a:lvl1pPr>
-          </a:lstStyle>
-          <a:p>
-            <a:r>
-              <a:t>Score</a:t>
-            </a:r>
-          </a:p>
-        </p:txBody>
-      </p:sp>
-      <p:sp>
-        <p:nvSpPr>
-          <p:cNvPr id="241" name="Process"/>
-          <p:cNvSpPr txBox="1"/>
-          <p:nvPr/>
-        </p:nvSpPr>
-        <p:spPr>
-          <a:xfrm>
-            <a:off x="18011908" y="8101076"/>
-            <a:ext cx="4987527" cy="535433"/>
-          </a:xfrm>
-          <a:prstGeom prst="rect">
-            <a:avLst/>
-          </a:prstGeom>
-          <a:ln w="12700">
-            <a:miter lim="400000"/>
-          </a:ln>
-          <a:extLst>
-            <a:ext uri="{C572A759-6A51-4108-AA02-DFA0A04FC94B}">
-              <ma14:wrappingTextBoxFlag xmlns:ma14="http://schemas.microsoft.com/office/mac/drawingml/2011/main" val="1"/>
-            </a:ext>
-          </a:extLst>
-        </p:spPr>
-        <p:txBody>
-          <a:bodyPr lIns="50800" tIns="50800" rIns="50800" bIns="50800">
-            <a:spAutoFit/>
-          </a:bodyPr>
-          <a:lstStyle>
-            <a:lvl1pPr defTabSz="12700">
-              <a:tabLst>
-                <a:tab pos="355600" algn="l"/>
-                <a:tab pos="711200" algn="l"/>
-                <a:tab pos="1066800" algn="l"/>
-                <a:tab pos="1422400" algn="l"/>
-                <a:tab pos="1778000" algn="l"/>
-                <a:tab pos="2133600" algn="l"/>
-                <a:tab pos="2489200" algn="l"/>
-                <a:tab pos="2844800" algn="l"/>
-                <a:tab pos="3200400" algn="l"/>
-                <a:tab pos="3556000" algn="l"/>
-                <a:tab pos="3911600" algn="l"/>
-                <a:tab pos="4267200" algn="l"/>
-              </a:tabLst>
-              <a:defRPr>
-                <a:solidFill>
-                  <a:srgbClr val="00CB9F"/>
-                </a:solidFill>
-                <a:latin typeface="+mn-lt"/>
-                <a:ea typeface="+mn-ea"/>
-                <a:cs typeface="+mn-cs"/>
-                <a:sym typeface="Ubuntu"/>
-              </a:defRPr>
-            </a:lvl1pPr>
-          </a:lstStyle>
-          <a:p>
-            <a:r>
-              <a:t>Winner takes all</a:t>
-            </a:r>
-          </a:p>
-        </p:txBody>
-      </p:sp>
-      <p:pic>
-        <p:nvPicPr>
-          <p:cNvPr id="242" name="analyse.png" descr="analyse.png"/>
-          <p:cNvPicPr>
-            <a:picLocks noChangeAspect="1"/>
-          </p:cNvPicPr>
-          <p:nvPr/>
-        </p:nvPicPr>
-        <p:blipFill>
-          <a:blip r:embed="rId3">
-            <a:extLst/>
-          </a:blip>
-          <a:stretch>
-            <a:fillRect/>
-          </a:stretch>
-        </p:blipFill>
-        <p:spPr>
-          <a:xfrm>
-            <a:off x="7420438" y="4263301"/>
-            <a:ext cx="3556001" cy="3556001"/>
-          </a:xfrm>
-          <a:prstGeom prst="rect">
-            <a:avLst/>
-          </a:prstGeom>
-          <a:ln w="12700">
-            <a:miter lim="400000"/>
-          </a:ln>
-        </p:spPr>
-      </p:pic>
-      <p:pic>
-        <p:nvPicPr>
-          <p:cNvPr id="243" name="prize.png" descr="prize.png"/>
-          <p:cNvPicPr>
-            <a:picLocks noChangeAspect="1"/>
-          </p:cNvPicPr>
-          <p:nvPr/>
-        </p:nvPicPr>
-        <p:blipFill>
-          <a:blip r:embed="rId4">
-            <a:extLst/>
-          </a:blip>
-          <a:stretch>
-            <a:fillRect/>
-          </a:stretch>
-        </p:blipFill>
-        <p:spPr>
-          <a:xfrm>
-            <a:off x="18727670" y="4263301"/>
-            <a:ext cx="3556001" cy="3556001"/>
-          </a:xfrm>
-          <a:prstGeom prst="rect">
-            <a:avLst/>
-          </a:prstGeom>
-          <a:ln w="12700">
-            <a:miter lim="400000"/>
-          </a:ln>
-        </p:spPr>
-      </p:pic>
-      <p:pic>
-        <p:nvPicPr>
-          <p:cNvPr id="244" name="score.png" descr="score.png"/>
-          <p:cNvPicPr>
-            <a:picLocks noChangeAspect="1"/>
-          </p:cNvPicPr>
-          <p:nvPr/>
-        </p:nvPicPr>
-        <p:blipFill>
-          <a:blip r:embed="rId5">
-            <a:extLst/>
-          </a:blip>
-          <a:stretch>
-            <a:fillRect/>
-          </a:stretch>
-        </p:blipFill>
-        <p:spPr>
-          <a:xfrm>
-            <a:off x="13074054" y="4263301"/>
-            <a:ext cx="3556001" cy="3556001"/>
-          </a:xfrm>
-          <a:prstGeom prst="rect">
-            <a:avLst/>
-          </a:prstGeom>
-          <a:ln w="12700">
-            <a:miter lim="400000"/>
-          </a:ln>
-        </p:spPr>
-      </p:pic>
-      <p:sp>
-        <p:nvSpPr>
-          <p:cNvPr id="245" name="Create a team with 2-4 of your smartest friends. (Extra points given for creative team names)"/>
-          <p:cNvSpPr txBox="1">
-            <a:spLocks noGrp="1"/>
-          </p:cNvSpPr>
-          <p:nvPr>
-            <p:ph type="body" sz="quarter" idx="4294967295"/>
-          </p:nvPr>
-        </p:nvSpPr>
-        <p:spPr>
-          <a:xfrm>
-            <a:off x="968176" y="8803847"/>
-            <a:ext cx="5153291" cy="1976835"/>
-          </a:xfrm>
-          <a:prstGeom prst="rect">
-            <a:avLst/>
-          </a:prstGeom>
-        </p:spPr>
-        <p:txBody>
-          <a:bodyPr/>
-          <a:lstStyle>
-            <a:lvl1pPr algn="l">
-              <a:lnSpc>
-                <a:spcPct val="110000"/>
-              </a:lnSpc>
-              <a:spcBef>
-                <a:spcPts val="2000"/>
-              </a:spcBef>
-              <a:defRPr sz="2600"/>
-            </a:lvl1pPr>
-          </a:lstStyle>
-          <a:p>
-            <a:r>
-              <a:t>Create a team with 2-4 of your smartest friends. (Extra points given for creative team names)</a:t>
-            </a:r>
-          </a:p>
-        </p:txBody>
-      </p:sp>
-      <p:sp>
-        <p:nvSpPr>
-          <p:cNvPr id="246" name="1"/>
-          <p:cNvSpPr/>
-          <p:nvPr/>
-        </p:nvSpPr>
-        <p:spPr>
-          <a:xfrm>
-            <a:off x="2020821" y="4552188"/>
-            <a:ext cx="635001" cy="635001"/>
-          </a:xfrm>
-          <a:prstGeom prst="ellipse">
-            <a:avLst/>
-          </a:prstGeom>
-          <a:solidFill>
-            <a:srgbClr val="02C38F"/>
-          </a:solidFill>
-          <a:ln w="12700">
-            <a:miter lim="400000"/>
-          </a:ln>
-          <a:extLst>
-            <a:ext uri="{C572A759-6A51-4108-AA02-DFA0A04FC94B}">
-              <ma14:wrappingTextBoxFlag xmlns:ma14="http://schemas.microsoft.com/office/mac/drawingml/2011/main" val="1"/>
-            </a:ext>
-          </a:extLst>
-        </p:spPr>
-        <p:txBody>
-          <a:bodyPr lIns="0" tIns="0" rIns="0" bIns="0" anchor="ctr"/>
-          <a:lstStyle>
-            <a:lvl1pPr>
-              <a:defRPr sz="2500" b="0">
-                <a:solidFill>
-                  <a:srgbClr val="FFFFFF"/>
-                </a:solidFill>
-                <a:latin typeface="+mn-lt"/>
-                <a:ea typeface="+mn-ea"/>
-                <a:cs typeface="+mn-cs"/>
-                <a:sym typeface="Ubuntu"/>
-              </a:defRPr>
-            </a:lvl1pPr>
-          </a:lstStyle>
-          <a:p>
-            <a:r>
-              <a:t>1</a:t>
-            </a:r>
-          </a:p>
-        </p:txBody>
-      </p:sp>
-      <p:sp>
-        <p:nvSpPr>
-          <p:cNvPr id="247" name="2"/>
-          <p:cNvSpPr/>
-          <p:nvPr/>
-        </p:nvSpPr>
-        <p:spPr>
-          <a:xfrm>
-            <a:off x="7674438" y="4552188"/>
-            <a:ext cx="635001" cy="635001"/>
-          </a:xfrm>
-          <a:prstGeom prst="ellipse">
-            <a:avLst/>
-          </a:prstGeom>
-          <a:solidFill>
-            <a:srgbClr val="02C38F"/>
-          </a:solidFill>
-          <a:ln w="12700">
-            <a:miter lim="400000"/>
-          </a:ln>
-          <a:extLst>
-            <a:ext uri="{C572A759-6A51-4108-AA02-DFA0A04FC94B}">
-              <ma14:wrappingTextBoxFlag xmlns:ma14="http://schemas.microsoft.com/office/mac/drawingml/2011/main" val="1"/>
-            </a:ext>
-          </a:extLst>
-        </p:spPr>
-        <p:txBody>
-          <a:bodyPr lIns="0" tIns="0" rIns="0" bIns="0" anchor="ctr"/>
-          <a:lstStyle>
-            <a:lvl1pPr>
-              <a:defRPr sz="2500" b="0">
-                <a:solidFill>
-                  <a:srgbClr val="FFFFFF"/>
-                </a:solidFill>
-                <a:latin typeface="+mn-lt"/>
-                <a:ea typeface="+mn-ea"/>
-                <a:cs typeface="+mn-cs"/>
-                <a:sym typeface="Ubuntu"/>
-              </a:defRPr>
-            </a:lvl1pPr>
-          </a:lstStyle>
-          <a:p>
-            <a:r>
-              <a:t>2</a:t>
-            </a:r>
-          </a:p>
-        </p:txBody>
-      </p:sp>
-      <p:sp>
-        <p:nvSpPr>
-          <p:cNvPr id="248" name="3"/>
-          <p:cNvSpPr/>
-          <p:nvPr/>
-        </p:nvSpPr>
-        <p:spPr>
-          <a:xfrm>
-            <a:off x="13328054" y="4552188"/>
-            <a:ext cx="635001" cy="635001"/>
-          </a:xfrm>
-          <a:prstGeom prst="ellipse">
-            <a:avLst/>
-          </a:prstGeom>
-          <a:solidFill>
-            <a:srgbClr val="02C38F"/>
-          </a:solidFill>
-          <a:ln w="12700">
-            <a:miter lim="400000"/>
-          </a:ln>
-          <a:extLst>
-            <a:ext uri="{C572A759-6A51-4108-AA02-DFA0A04FC94B}">
-              <ma14:wrappingTextBoxFlag xmlns:ma14="http://schemas.microsoft.com/office/mac/drawingml/2011/main" val="1"/>
-            </a:ext>
-          </a:extLst>
-        </p:spPr>
-        <p:txBody>
-          <a:bodyPr lIns="0" tIns="0" rIns="0" bIns="0" anchor="ctr"/>
-          <a:lstStyle>
-            <a:lvl1pPr>
-              <a:defRPr sz="2500" b="0">
-                <a:solidFill>
-                  <a:srgbClr val="FFFFFF"/>
-                </a:solidFill>
-                <a:latin typeface="+mn-lt"/>
-                <a:ea typeface="+mn-ea"/>
-                <a:cs typeface="+mn-cs"/>
-                <a:sym typeface="Ubuntu"/>
-              </a:defRPr>
-            </a:lvl1pPr>
-          </a:lstStyle>
-          <a:p>
-            <a:r>
-              <a:t>3</a:t>
-            </a:r>
-          </a:p>
-        </p:txBody>
-      </p:sp>
-      <p:sp>
-        <p:nvSpPr>
-          <p:cNvPr id="249" name="4"/>
-          <p:cNvSpPr/>
-          <p:nvPr/>
-        </p:nvSpPr>
-        <p:spPr>
-          <a:xfrm>
-            <a:off x="18981670" y="4552188"/>
-            <a:ext cx="635001" cy="635001"/>
-          </a:xfrm>
-          <a:prstGeom prst="ellipse">
-            <a:avLst/>
-          </a:prstGeom>
-          <a:solidFill>
-            <a:srgbClr val="02C38F"/>
-          </a:solidFill>
-          <a:ln w="12700">
-            <a:miter lim="400000"/>
-          </a:ln>
-          <a:extLst>
-            <a:ext uri="{C572A759-6A51-4108-AA02-DFA0A04FC94B}">
-              <ma14:wrappingTextBoxFlag xmlns:ma14="http://schemas.microsoft.com/office/mac/drawingml/2011/main" val="1"/>
-            </a:ext>
-          </a:extLst>
-        </p:spPr>
-        <p:txBody>
-          <a:bodyPr lIns="0" tIns="0" rIns="0" bIns="0" anchor="ctr"/>
-          <a:lstStyle>
-            <a:lvl1pPr>
-              <a:defRPr sz="2500" b="0">
-                <a:solidFill>
-                  <a:srgbClr val="FFFFFF"/>
-                </a:solidFill>
-                <a:latin typeface="+mn-lt"/>
-                <a:ea typeface="+mn-ea"/>
-                <a:cs typeface="+mn-cs"/>
-                <a:sym typeface="Ubuntu"/>
-              </a:defRPr>
-            </a:lvl1pPr>
-          </a:lstStyle>
-          <a:p>
-            <a:r>
-              <a:t>4</a:t>
-            </a:r>
-          </a:p>
-        </p:txBody>
-      </p:sp>
-      <p:sp>
-        <p:nvSpPr>
-          <p:cNvPr id="250" name="Process"/>
-          <p:cNvSpPr txBox="1"/>
-          <p:nvPr/>
-        </p:nvSpPr>
-        <p:spPr>
-          <a:xfrm>
-            <a:off x="1051058" y="8101076"/>
-            <a:ext cx="4987527" cy="535433"/>
-          </a:xfrm>
-          <a:prstGeom prst="rect">
-            <a:avLst/>
-          </a:prstGeom>
-          <a:ln w="12700">
-            <a:miter lim="400000"/>
-          </a:ln>
-          <a:extLst>
-            <a:ext uri="{C572A759-6A51-4108-AA02-DFA0A04FC94B}">
-              <ma14:wrappingTextBoxFlag xmlns:ma14="http://schemas.microsoft.com/office/mac/drawingml/2011/main" val="1"/>
-            </a:ext>
-          </a:extLst>
-        </p:spPr>
-        <p:txBody>
-          <a:bodyPr lIns="50800" tIns="50800" rIns="50800" bIns="50800">
-            <a:spAutoFit/>
-          </a:bodyPr>
-          <a:lstStyle>
-            <a:lvl1pPr defTabSz="12700">
-              <a:tabLst>
-                <a:tab pos="355600" algn="l"/>
-                <a:tab pos="711200" algn="l"/>
-                <a:tab pos="1066800" algn="l"/>
-                <a:tab pos="1422400" algn="l"/>
-                <a:tab pos="1778000" algn="l"/>
-                <a:tab pos="2133600" algn="l"/>
-                <a:tab pos="2489200" algn="l"/>
-                <a:tab pos="2844800" algn="l"/>
-                <a:tab pos="3200400" algn="l"/>
-                <a:tab pos="3556000" algn="l"/>
-                <a:tab pos="3911600" algn="l"/>
-                <a:tab pos="4267200" algn="l"/>
-              </a:tabLst>
-              <a:defRPr>
-                <a:solidFill>
-                  <a:srgbClr val="00CB9F"/>
-                </a:solidFill>
-                <a:latin typeface="+mn-lt"/>
-                <a:ea typeface="+mn-ea"/>
-                <a:cs typeface="+mn-cs"/>
-                <a:sym typeface="Ubuntu"/>
-              </a:defRPr>
-            </a:lvl1pPr>
-          </a:lstStyle>
-          <a:p>
-            <a:r>
-              <a:t>Team Up!</a:t>
-            </a:r>
-          </a:p>
-        </p:txBody>
-      </p:sp>
-      <p:sp>
-        <p:nvSpPr>
-          <p:cNvPr id="251" name="You have 90 minutes to analyse and improve a chosen open source software with the help of Gamma."/>
-          <p:cNvSpPr txBox="1"/>
-          <p:nvPr/>
-        </p:nvSpPr>
-        <p:spPr>
-          <a:xfrm>
-            <a:off x="6621792" y="8803847"/>
-            <a:ext cx="5153291" cy="1976835"/>
-          </a:xfrm>
-          <a:prstGeom prst="rect">
-            <a:avLst/>
-          </a:prstGeom>
-          <a:ln w="12700">
-            <a:miter lim="400000"/>
-          </a:ln>
-          <a:extLst>
-            <a:ext uri="{C572A759-6A51-4108-AA02-DFA0A04FC94B}">
-              <ma14:wrappingTextBoxFlag xmlns:ma14="http://schemas.microsoft.com/office/mac/drawingml/2011/main" val="1"/>
-            </a:ext>
-          </a:extLst>
-        </p:spPr>
-        <p:txBody>
-          <a:bodyPr lIns="50800" tIns="50800" rIns="50800" bIns="50800">
-            <a:normAutofit/>
-          </a:bodyPr>
-          <a:lstStyle>
-            <a:lvl1pPr algn="l">
-              <a:lnSpc>
-                <a:spcPct val="110000"/>
-              </a:lnSpc>
-              <a:spcBef>
-                <a:spcPts val="2000"/>
-              </a:spcBef>
-              <a:defRPr sz="2600" b="0">
-                <a:solidFill>
-                  <a:srgbClr val="3B444D"/>
-                </a:solidFill>
-                <a:latin typeface="+mn-lt"/>
-                <a:ea typeface="+mn-ea"/>
-                <a:cs typeface="+mn-cs"/>
-                <a:sym typeface="Ubuntu"/>
-              </a:defRPr>
-            </a:lvl1pPr>
-          </a:lstStyle>
-          <a:p>
-            <a:r>
-              <a:t>You have 90 minutes to analyse and improve a chosen open source software with the help of Gamma.</a:t>
-            </a:r>
-          </a:p>
-        </p:txBody>
-      </p:sp>
-      <p:sp>
-        <p:nvSpPr>
-          <p:cNvPr id="252" name="The team with the highest overall Gamma quality score wins."/>
-          <p:cNvSpPr txBox="1"/>
-          <p:nvPr/>
-        </p:nvSpPr>
-        <p:spPr>
-          <a:xfrm>
-            <a:off x="12275409" y="8803847"/>
-            <a:ext cx="5153291" cy="1976835"/>
-          </a:xfrm>
-          <a:prstGeom prst="rect">
-            <a:avLst/>
-          </a:prstGeom>
-          <a:ln w="12700">
-            <a:miter lim="400000"/>
-          </a:ln>
-          <a:extLst>
-            <a:ext uri="{C572A759-6A51-4108-AA02-DFA0A04FC94B}">
-              <ma14:wrappingTextBoxFlag xmlns:ma14="http://schemas.microsoft.com/office/mac/drawingml/2011/main" val="1"/>
-            </a:ext>
-          </a:extLst>
-        </p:spPr>
-        <p:txBody>
-          <a:bodyPr lIns="50800" tIns="50800" rIns="50800" bIns="50800">
-            <a:normAutofit/>
-          </a:bodyPr>
-          <a:lstStyle>
-            <a:lvl1pPr algn="l">
-              <a:lnSpc>
-                <a:spcPct val="110000"/>
-              </a:lnSpc>
-              <a:spcBef>
-                <a:spcPts val="2000"/>
-              </a:spcBef>
-              <a:defRPr sz="2600" b="0">
-                <a:solidFill>
-                  <a:srgbClr val="3B444D"/>
-                </a:solidFill>
-                <a:latin typeface="+mn-lt"/>
-                <a:ea typeface="+mn-ea"/>
-                <a:cs typeface="+mn-cs"/>
-                <a:sym typeface="Ubuntu"/>
-              </a:defRPr>
-            </a:lvl1pPr>
-          </a:lstStyle>
-          <a:p>
-            <a:r>
-              <a:t>The team with the highest overall Gamma quality score wins.</a:t>
-            </a:r>
-          </a:p>
-        </p:txBody>
-      </p:sp>
-      <p:sp>
-        <p:nvSpPr>
-          <p:cNvPr id="253" name="Winning team receives a €20 Amazon gift card (per person) and a Gamma T-shirt."/>
-          <p:cNvSpPr txBox="1"/>
-          <p:nvPr/>
-        </p:nvSpPr>
-        <p:spPr>
-          <a:xfrm>
-            <a:off x="17929026" y="8803847"/>
-            <a:ext cx="5153291" cy="1976835"/>
-          </a:xfrm>
-          <a:prstGeom prst="rect">
-            <a:avLst/>
-          </a:prstGeom>
-          <a:ln w="12700">
-            <a:miter lim="400000"/>
-          </a:ln>
-          <a:extLst>
-            <a:ext uri="{C572A759-6A51-4108-AA02-DFA0A04FC94B}">
-              <ma14:wrappingTextBoxFlag xmlns:ma14="http://schemas.microsoft.com/office/mac/drawingml/2011/main" val="1"/>
-            </a:ext>
-          </a:extLst>
-        </p:spPr>
-        <p:txBody>
-          <a:bodyPr lIns="50800" tIns="50800" rIns="50800" bIns="50800">
-            <a:normAutofit/>
-          </a:bodyPr>
-          <a:lstStyle>
-            <a:lvl1pPr algn="l">
-              <a:lnSpc>
-                <a:spcPct val="110000"/>
-              </a:lnSpc>
-              <a:spcBef>
-                <a:spcPts val="2000"/>
-              </a:spcBef>
-              <a:defRPr sz="2600" b="0">
-                <a:solidFill>
-                  <a:srgbClr val="3B444D"/>
-                </a:solidFill>
-                <a:latin typeface="+mn-lt"/>
-                <a:ea typeface="+mn-ea"/>
-                <a:cs typeface="+mn-cs"/>
-                <a:sym typeface="Ubuntu"/>
-              </a:defRPr>
-            </a:lvl1pPr>
-          </a:lstStyle>
-          <a:p>
-            <a:r>
-              <a:t>Winning team receives a €20 Amazon gift card (per person) and a Gamma T-shirt.</a:t>
-            </a:r>
-          </a:p>
-        </p:txBody>
-      </p:sp>
-    </p:spTree>
-  </p:cSld>
-  <p:clrMapOvr>
-    <a:masterClrMapping/>
-  </p:clrMapOvr>
-  <p:transition spd="med"/>
-</p:sld>
-</file>
-
-<file path=ppt/slides/slide3.xml><?xml version="1.0" encoding="utf-8"?>
-<p:sld xmlns:a="http://schemas.openxmlformats.org/drawingml/2006/main" xmlns:r="http://schemas.openxmlformats.org/officeDocument/2006/relationships" xmlns:p="http://schemas.openxmlformats.org/presentationml/2006/main">
-  <p:cSld>
-    <p:spTree>
-      <p:nvGrpSpPr>
-        <p:cNvPr id="1" name=""/>
-        <p:cNvGrpSpPr/>
-        <p:nvPr/>
-      </p:nvGrpSpPr>
-      <p:grpSpPr>
-        <a:xfrm>
-          <a:off x="0" y="0"/>
-          <a:ext cx="0" cy="0"/>
-          <a:chOff x="0" y="0"/>
-          <a:chExt cx="0" cy="0"/>
-        </a:xfrm>
-      </p:grpSpPr>
-      <p:sp>
-        <p:nvSpPr>
           <p:cNvPr id="255" name="Rectangle"/>
           <p:cNvSpPr/>
           <p:nvPr/>
@@ -5078,7 +4247,7 @@
           <a:lstStyle/>
           <a:p>
             <a:fld id="{86CB4B4D-7CA3-9044-876B-883B54F8677D}" type="slidenum">
-              <a:t>3</a:t>
+              <a:t>2</a:t>
             </a:fld>
             <a:endParaRPr/>
           </a:p>
@@ -6105,6 +5274,842 @@
 </p:sld>
 </file>
 
+<file path=ppt/slides/slide3.xml><?xml version="1.0" encoding="utf-8"?>
+<p:sld xmlns:a="http://schemas.openxmlformats.org/drawingml/2006/main" xmlns:r="http://schemas.openxmlformats.org/officeDocument/2006/relationships" xmlns:p="http://schemas.openxmlformats.org/presentationml/2006/main">
+  <p:cSld>
+    <p:spTree>
+      <p:nvGrpSpPr>
+        <p:cNvPr id="1" name=""/>
+        <p:cNvGrpSpPr/>
+        <p:nvPr/>
+      </p:nvGrpSpPr>
+      <p:grpSpPr>
+        <a:xfrm>
+          <a:off x="0" y="0"/>
+          <a:ext cx="0" cy="0"/>
+          <a:chOff x="0" y="0"/>
+          <a:chExt cx="0" cy="0"/>
+        </a:xfrm>
+      </p:grpSpPr>
+      <p:sp>
+        <p:nvSpPr>
+          <p:cNvPr id="236" name="Let the games begin!"/>
+          <p:cNvSpPr txBox="1">
+            <a:spLocks noGrp="1"/>
+          </p:cNvSpPr>
+          <p:nvPr>
+            <p:ph type="title"/>
+          </p:nvPr>
+        </p:nvSpPr>
+        <p:spPr>
+          <a:prstGeom prst="rect">
+            <a:avLst/>
+          </a:prstGeom>
+        </p:spPr>
+        <p:txBody>
+          <a:bodyPr/>
+          <a:lstStyle/>
+          <a:p>
+            <a:r>
+              <a:t>Let the games begin!</a:t>
+            </a:r>
+          </a:p>
+        </p:txBody>
+      </p:sp>
+      <p:sp>
+        <p:nvSpPr>
+          <p:cNvPr id="237" name="Slide Number"/>
+          <p:cNvSpPr txBox="1">
+            <a:spLocks noGrp="1"/>
+          </p:cNvSpPr>
+          <p:nvPr>
+            <p:ph type="sldNum" sz="quarter" idx="2"/>
+          </p:nvPr>
+        </p:nvSpPr>
+        <p:spPr>
+          <a:xfrm>
+            <a:off x="23381664" y="12863170"/>
+            <a:ext cx="243232" cy="361900"/>
+          </a:xfrm>
+          <a:prstGeom prst="rect">
+            <a:avLst/>
+          </a:prstGeom>
+          <a:extLst>
+            <a:ext uri="{C572A759-6A51-4108-AA02-DFA0A04FC94B}">
+              <ma14:wrappingTextBoxFlag xmlns:ma14="http://schemas.microsoft.com/office/mac/drawingml/2011/main" val="1"/>
+            </a:ext>
+          </a:extLst>
+        </p:spPr>
+        <p:txBody>
+          <a:bodyPr/>
+          <a:lstStyle/>
+          <a:p>
+            <a:fld id="{86CB4B4D-7CA3-9044-876B-883B54F8677D}" type="slidenum">
+              <a:t>3</a:t>
+            </a:fld>
+            <a:endParaRPr/>
+          </a:p>
+        </p:txBody>
+      </p:sp>
+      <p:pic>
+        <p:nvPicPr>
+          <p:cNvPr id="238" name="team.png" descr="team.png"/>
+          <p:cNvPicPr>
+            <a:picLocks noChangeAspect="1"/>
+          </p:cNvPicPr>
+          <p:nvPr/>
+        </p:nvPicPr>
+        <p:blipFill>
+          <a:blip r:embed="rId2">
+            <a:extLst/>
+          </a:blip>
+          <a:stretch>
+            <a:fillRect/>
+          </a:stretch>
+        </p:blipFill>
+        <p:spPr>
+          <a:xfrm>
+            <a:off x="1766821" y="4279391"/>
+            <a:ext cx="3556001" cy="3539911"/>
+          </a:xfrm>
+          <a:prstGeom prst="rect">
+            <a:avLst/>
+          </a:prstGeom>
+          <a:ln w="12700">
+            <a:miter lim="400000"/>
+          </a:ln>
+        </p:spPr>
+      </p:pic>
+      <p:sp>
+        <p:nvSpPr>
+          <p:cNvPr id="239" name="Process"/>
+          <p:cNvSpPr txBox="1"/>
+          <p:nvPr/>
+        </p:nvSpPr>
+        <p:spPr>
+          <a:xfrm>
+            <a:off x="6704674" y="8101076"/>
+            <a:ext cx="4987528" cy="535433"/>
+          </a:xfrm>
+          <a:prstGeom prst="rect">
+            <a:avLst/>
+          </a:prstGeom>
+          <a:ln w="12700">
+            <a:miter lim="400000"/>
+          </a:ln>
+          <a:extLst>
+            <a:ext uri="{C572A759-6A51-4108-AA02-DFA0A04FC94B}">
+              <ma14:wrappingTextBoxFlag xmlns:ma14="http://schemas.microsoft.com/office/mac/drawingml/2011/main" val="1"/>
+            </a:ext>
+          </a:extLst>
+        </p:spPr>
+        <p:txBody>
+          <a:bodyPr lIns="50800" tIns="50800" rIns="50800" bIns="50800">
+            <a:spAutoFit/>
+          </a:bodyPr>
+          <a:lstStyle>
+            <a:lvl1pPr defTabSz="12700">
+              <a:tabLst>
+                <a:tab pos="355600" algn="l"/>
+                <a:tab pos="711200" algn="l"/>
+                <a:tab pos="1066800" algn="l"/>
+                <a:tab pos="1422400" algn="l"/>
+                <a:tab pos="1778000" algn="l"/>
+                <a:tab pos="2133600" algn="l"/>
+                <a:tab pos="2489200" algn="l"/>
+                <a:tab pos="2844800" algn="l"/>
+                <a:tab pos="3200400" algn="l"/>
+                <a:tab pos="3556000" algn="l"/>
+                <a:tab pos="3911600" algn="l"/>
+                <a:tab pos="4267200" algn="l"/>
+              </a:tabLst>
+              <a:defRPr>
+                <a:solidFill>
+                  <a:srgbClr val="00CB9F"/>
+                </a:solidFill>
+                <a:latin typeface="+mn-lt"/>
+                <a:ea typeface="+mn-ea"/>
+                <a:cs typeface="+mn-cs"/>
+                <a:sym typeface="Ubuntu"/>
+              </a:defRPr>
+            </a:lvl1pPr>
+          </a:lstStyle>
+          <a:p>
+            <a:r>
+              <a:t>Analyse</a:t>
+            </a:r>
+          </a:p>
+        </p:txBody>
+      </p:sp>
+      <p:sp>
+        <p:nvSpPr>
+          <p:cNvPr id="240" name="Process"/>
+          <p:cNvSpPr txBox="1"/>
+          <p:nvPr/>
+        </p:nvSpPr>
+        <p:spPr>
+          <a:xfrm>
+            <a:off x="12358291" y="8101076"/>
+            <a:ext cx="4987527" cy="535433"/>
+          </a:xfrm>
+          <a:prstGeom prst="rect">
+            <a:avLst/>
+          </a:prstGeom>
+          <a:ln w="12700">
+            <a:miter lim="400000"/>
+          </a:ln>
+          <a:extLst>
+            <a:ext uri="{C572A759-6A51-4108-AA02-DFA0A04FC94B}">
+              <ma14:wrappingTextBoxFlag xmlns:ma14="http://schemas.microsoft.com/office/mac/drawingml/2011/main" val="1"/>
+            </a:ext>
+          </a:extLst>
+        </p:spPr>
+        <p:txBody>
+          <a:bodyPr lIns="50800" tIns="50800" rIns="50800" bIns="50800">
+            <a:spAutoFit/>
+          </a:bodyPr>
+          <a:lstStyle>
+            <a:lvl1pPr defTabSz="12700">
+              <a:tabLst>
+                <a:tab pos="355600" algn="l"/>
+                <a:tab pos="711200" algn="l"/>
+                <a:tab pos="1066800" algn="l"/>
+                <a:tab pos="1422400" algn="l"/>
+                <a:tab pos="1778000" algn="l"/>
+                <a:tab pos="2133600" algn="l"/>
+                <a:tab pos="2489200" algn="l"/>
+                <a:tab pos="2844800" algn="l"/>
+                <a:tab pos="3200400" algn="l"/>
+                <a:tab pos="3556000" algn="l"/>
+                <a:tab pos="3911600" algn="l"/>
+                <a:tab pos="4267200" algn="l"/>
+              </a:tabLst>
+              <a:defRPr>
+                <a:solidFill>
+                  <a:srgbClr val="00CB9F"/>
+                </a:solidFill>
+                <a:latin typeface="+mn-lt"/>
+                <a:ea typeface="+mn-ea"/>
+                <a:cs typeface="+mn-cs"/>
+                <a:sym typeface="Ubuntu"/>
+              </a:defRPr>
+            </a:lvl1pPr>
+          </a:lstStyle>
+          <a:p>
+            <a:r>
+              <a:t>Score</a:t>
+            </a:r>
+          </a:p>
+        </p:txBody>
+      </p:sp>
+      <p:sp>
+        <p:nvSpPr>
+          <p:cNvPr id="241" name="Process"/>
+          <p:cNvSpPr txBox="1"/>
+          <p:nvPr/>
+        </p:nvSpPr>
+        <p:spPr>
+          <a:xfrm>
+            <a:off x="18011908" y="8101076"/>
+            <a:ext cx="4987527" cy="535433"/>
+          </a:xfrm>
+          <a:prstGeom prst="rect">
+            <a:avLst/>
+          </a:prstGeom>
+          <a:ln w="12700">
+            <a:miter lim="400000"/>
+          </a:ln>
+          <a:extLst>
+            <a:ext uri="{C572A759-6A51-4108-AA02-DFA0A04FC94B}">
+              <ma14:wrappingTextBoxFlag xmlns:ma14="http://schemas.microsoft.com/office/mac/drawingml/2011/main" val="1"/>
+            </a:ext>
+          </a:extLst>
+        </p:spPr>
+        <p:txBody>
+          <a:bodyPr lIns="50800" tIns="50800" rIns="50800" bIns="50800">
+            <a:spAutoFit/>
+          </a:bodyPr>
+          <a:lstStyle>
+            <a:lvl1pPr defTabSz="12700">
+              <a:tabLst>
+                <a:tab pos="355600" algn="l"/>
+                <a:tab pos="711200" algn="l"/>
+                <a:tab pos="1066800" algn="l"/>
+                <a:tab pos="1422400" algn="l"/>
+                <a:tab pos="1778000" algn="l"/>
+                <a:tab pos="2133600" algn="l"/>
+                <a:tab pos="2489200" algn="l"/>
+                <a:tab pos="2844800" algn="l"/>
+                <a:tab pos="3200400" algn="l"/>
+                <a:tab pos="3556000" algn="l"/>
+                <a:tab pos="3911600" algn="l"/>
+                <a:tab pos="4267200" algn="l"/>
+              </a:tabLst>
+              <a:defRPr>
+                <a:solidFill>
+                  <a:srgbClr val="00CB9F"/>
+                </a:solidFill>
+                <a:latin typeface="+mn-lt"/>
+                <a:ea typeface="+mn-ea"/>
+                <a:cs typeface="+mn-cs"/>
+                <a:sym typeface="Ubuntu"/>
+              </a:defRPr>
+            </a:lvl1pPr>
+          </a:lstStyle>
+          <a:p>
+            <a:r>
+              <a:t>Winner takes all</a:t>
+            </a:r>
+          </a:p>
+        </p:txBody>
+      </p:sp>
+      <p:pic>
+        <p:nvPicPr>
+          <p:cNvPr id="242" name="analyse.png" descr="analyse.png"/>
+          <p:cNvPicPr>
+            <a:picLocks noChangeAspect="1"/>
+          </p:cNvPicPr>
+          <p:nvPr/>
+        </p:nvPicPr>
+        <p:blipFill>
+          <a:blip r:embed="rId3">
+            <a:extLst/>
+          </a:blip>
+          <a:stretch>
+            <a:fillRect/>
+          </a:stretch>
+        </p:blipFill>
+        <p:spPr>
+          <a:xfrm>
+            <a:off x="7420438" y="4263301"/>
+            <a:ext cx="3556001" cy="3556001"/>
+          </a:xfrm>
+          <a:prstGeom prst="rect">
+            <a:avLst/>
+          </a:prstGeom>
+          <a:ln w="12700">
+            <a:miter lim="400000"/>
+          </a:ln>
+        </p:spPr>
+      </p:pic>
+      <p:pic>
+        <p:nvPicPr>
+          <p:cNvPr id="243" name="prize.png" descr="prize.png"/>
+          <p:cNvPicPr>
+            <a:picLocks noChangeAspect="1"/>
+          </p:cNvPicPr>
+          <p:nvPr/>
+        </p:nvPicPr>
+        <p:blipFill>
+          <a:blip r:embed="rId4">
+            <a:extLst/>
+          </a:blip>
+          <a:stretch>
+            <a:fillRect/>
+          </a:stretch>
+        </p:blipFill>
+        <p:spPr>
+          <a:xfrm>
+            <a:off x="18727670" y="4263301"/>
+            <a:ext cx="3556001" cy="3556001"/>
+          </a:xfrm>
+          <a:prstGeom prst="rect">
+            <a:avLst/>
+          </a:prstGeom>
+          <a:ln w="12700">
+            <a:miter lim="400000"/>
+          </a:ln>
+        </p:spPr>
+      </p:pic>
+      <p:pic>
+        <p:nvPicPr>
+          <p:cNvPr id="244" name="score.png" descr="score.png"/>
+          <p:cNvPicPr>
+            <a:picLocks noChangeAspect="1"/>
+          </p:cNvPicPr>
+          <p:nvPr/>
+        </p:nvPicPr>
+        <p:blipFill>
+          <a:blip r:embed="rId5">
+            <a:extLst/>
+          </a:blip>
+          <a:stretch>
+            <a:fillRect/>
+          </a:stretch>
+        </p:blipFill>
+        <p:spPr>
+          <a:xfrm>
+            <a:off x="13074054" y="4263301"/>
+            <a:ext cx="3556001" cy="3556001"/>
+          </a:xfrm>
+          <a:prstGeom prst="rect">
+            <a:avLst/>
+          </a:prstGeom>
+          <a:ln w="12700">
+            <a:miter lim="400000"/>
+          </a:ln>
+        </p:spPr>
+      </p:pic>
+      <p:sp>
+        <p:nvSpPr>
+          <p:cNvPr id="245" name="Create a team with 2-4 of your smartest friends. (Extra points given for creative team names)"/>
+          <p:cNvSpPr txBox="1">
+            <a:spLocks noGrp="1"/>
+          </p:cNvSpPr>
+          <p:nvPr>
+            <p:ph type="body" sz="quarter" idx="4294967295"/>
+          </p:nvPr>
+        </p:nvSpPr>
+        <p:spPr>
+          <a:xfrm>
+            <a:off x="968176" y="8803847"/>
+            <a:ext cx="5153291" cy="1976835"/>
+          </a:xfrm>
+          <a:prstGeom prst="rect">
+            <a:avLst/>
+          </a:prstGeom>
+        </p:spPr>
+        <p:txBody>
+          <a:bodyPr/>
+          <a:lstStyle>
+            <a:lvl1pPr algn="l">
+              <a:lnSpc>
+                <a:spcPct val="110000"/>
+              </a:lnSpc>
+              <a:spcBef>
+                <a:spcPts val="2000"/>
+              </a:spcBef>
+              <a:defRPr sz="2600"/>
+            </a:lvl1pPr>
+          </a:lstStyle>
+          <a:p>
+            <a:r>
+              <a:t>Create a team with 2-4 of your smartest friends. (Extra points given for creative team names)</a:t>
+            </a:r>
+          </a:p>
+        </p:txBody>
+      </p:sp>
+      <p:sp>
+        <p:nvSpPr>
+          <p:cNvPr id="246" name="1"/>
+          <p:cNvSpPr/>
+          <p:nvPr/>
+        </p:nvSpPr>
+        <p:spPr>
+          <a:xfrm>
+            <a:off x="2020821" y="4552188"/>
+            <a:ext cx="635001" cy="635001"/>
+          </a:xfrm>
+          <a:prstGeom prst="ellipse">
+            <a:avLst/>
+          </a:prstGeom>
+          <a:solidFill>
+            <a:srgbClr val="02C38F"/>
+          </a:solidFill>
+          <a:ln w="12700">
+            <a:miter lim="400000"/>
+          </a:ln>
+          <a:extLst>
+            <a:ext uri="{C572A759-6A51-4108-AA02-DFA0A04FC94B}">
+              <ma14:wrappingTextBoxFlag xmlns:ma14="http://schemas.microsoft.com/office/mac/drawingml/2011/main" val="1"/>
+            </a:ext>
+          </a:extLst>
+        </p:spPr>
+        <p:txBody>
+          <a:bodyPr lIns="0" tIns="0" rIns="0" bIns="0" anchor="ctr"/>
+          <a:lstStyle>
+            <a:lvl1pPr>
+              <a:defRPr sz="2500" b="0">
+                <a:solidFill>
+                  <a:srgbClr val="FFFFFF"/>
+                </a:solidFill>
+                <a:latin typeface="+mn-lt"/>
+                <a:ea typeface="+mn-ea"/>
+                <a:cs typeface="+mn-cs"/>
+                <a:sym typeface="Ubuntu"/>
+              </a:defRPr>
+            </a:lvl1pPr>
+          </a:lstStyle>
+          <a:p>
+            <a:r>
+              <a:t>1</a:t>
+            </a:r>
+          </a:p>
+        </p:txBody>
+      </p:sp>
+      <p:sp>
+        <p:nvSpPr>
+          <p:cNvPr id="247" name="2"/>
+          <p:cNvSpPr/>
+          <p:nvPr/>
+        </p:nvSpPr>
+        <p:spPr>
+          <a:xfrm>
+            <a:off x="7674438" y="4552188"/>
+            <a:ext cx="635001" cy="635001"/>
+          </a:xfrm>
+          <a:prstGeom prst="ellipse">
+            <a:avLst/>
+          </a:prstGeom>
+          <a:solidFill>
+            <a:srgbClr val="02C38F"/>
+          </a:solidFill>
+          <a:ln w="12700">
+            <a:miter lim="400000"/>
+          </a:ln>
+          <a:extLst>
+            <a:ext uri="{C572A759-6A51-4108-AA02-DFA0A04FC94B}">
+              <ma14:wrappingTextBoxFlag xmlns:ma14="http://schemas.microsoft.com/office/mac/drawingml/2011/main" val="1"/>
+            </a:ext>
+          </a:extLst>
+        </p:spPr>
+        <p:txBody>
+          <a:bodyPr lIns="0" tIns="0" rIns="0" bIns="0" anchor="ctr"/>
+          <a:lstStyle>
+            <a:lvl1pPr>
+              <a:defRPr sz="2500" b="0">
+                <a:solidFill>
+                  <a:srgbClr val="FFFFFF"/>
+                </a:solidFill>
+                <a:latin typeface="+mn-lt"/>
+                <a:ea typeface="+mn-ea"/>
+                <a:cs typeface="+mn-cs"/>
+                <a:sym typeface="Ubuntu"/>
+              </a:defRPr>
+            </a:lvl1pPr>
+          </a:lstStyle>
+          <a:p>
+            <a:r>
+              <a:t>2</a:t>
+            </a:r>
+          </a:p>
+        </p:txBody>
+      </p:sp>
+      <p:sp>
+        <p:nvSpPr>
+          <p:cNvPr id="248" name="3"/>
+          <p:cNvSpPr/>
+          <p:nvPr/>
+        </p:nvSpPr>
+        <p:spPr>
+          <a:xfrm>
+            <a:off x="13328054" y="4552188"/>
+            <a:ext cx="635001" cy="635001"/>
+          </a:xfrm>
+          <a:prstGeom prst="ellipse">
+            <a:avLst/>
+          </a:prstGeom>
+          <a:solidFill>
+            <a:srgbClr val="02C38F"/>
+          </a:solidFill>
+          <a:ln w="12700">
+            <a:miter lim="400000"/>
+          </a:ln>
+          <a:extLst>
+            <a:ext uri="{C572A759-6A51-4108-AA02-DFA0A04FC94B}">
+              <ma14:wrappingTextBoxFlag xmlns:ma14="http://schemas.microsoft.com/office/mac/drawingml/2011/main" val="1"/>
+            </a:ext>
+          </a:extLst>
+        </p:spPr>
+        <p:txBody>
+          <a:bodyPr lIns="0" tIns="0" rIns="0" bIns="0" anchor="ctr"/>
+          <a:lstStyle>
+            <a:lvl1pPr>
+              <a:defRPr sz="2500" b="0">
+                <a:solidFill>
+                  <a:srgbClr val="FFFFFF"/>
+                </a:solidFill>
+                <a:latin typeface="+mn-lt"/>
+                <a:ea typeface="+mn-ea"/>
+                <a:cs typeface="+mn-cs"/>
+                <a:sym typeface="Ubuntu"/>
+              </a:defRPr>
+            </a:lvl1pPr>
+          </a:lstStyle>
+          <a:p>
+            <a:r>
+              <a:t>3</a:t>
+            </a:r>
+          </a:p>
+        </p:txBody>
+      </p:sp>
+      <p:sp>
+        <p:nvSpPr>
+          <p:cNvPr id="249" name="4"/>
+          <p:cNvSpPr/>
+          <p:nvPr/>
+        </p:nvSpPr>
+        <p:spPr>
+          <a:xfrm>
+            <a:off x="18981670" y="4552188"/>
+            <a:ext cx="635001" cy="635001"/>
+          </a:xfrm>
+          <a:prstGeom prst="ellipse">
+            <a:avLst/>
+          </a:prstGeom>
+          <a:solidFill>
+            <a:srgbClr val="02C38F"/>
+          </a:solidFill>
+          <a:ln w="12700">
+            <a:miter lim="400000"/>
+          </a:ln>
+          <a:extLst>
+            <a:ext uri="{C572A759-6A51-4108-AA02-DFA0A04FC94B}">
+              <ma14:wrappingTextBoxFlag xmlns:ma14="http://schemas.microsoft.com/office/mac/drawingml/2011/main" val="1"/>
+            </a:ext>
+          </a:extLst>
+        </p:spPr>
+        <p:txBody>
+          <a:bodyPr lIns="0" tIns="0" rIns="0" bIns="0" anchor="ctr"/>
+          <a:lstStyle>
+            <a:lvl1pPr>
+              <a:defRPr sz="2500" b="0">
+                <a:solidFill>
+                  <a:srgbClr val="FFFFFF"/>
+                </a:solidFill>
+                <a:latin typeface="+mn-lt"/>
+                <a:ea typeface="+mn-ea"/>
+                <a:cs typeface="+mn-cs"/>
+                <a:sym typeface="Ubuntu"/>
+              </a:defRPr>
+            </a:lvl1pPr>
+          </a:lstStyle>
+          <a:p>
+            <a:r>
+              <a:t>4</a:t>
+            </a:r>
+          </a:p>
+        </p:txBody>
+      </p:sp>
+      <p:sp>
+        <p:nvSpPr>
+          <p:cNvPr id="250" name="Process"/>
+          <p:cNvSpPr txBox="1"/>
+          <p:nvPr/>
+        </p:nvSpPr>
+        <p:spPr>
+          <a:xfrm>
+            <a:off x="1051058" y="8101076"/>
+            <a:ext cx="4987527" cy="535433"/>
+          </a:xfrm>
+          <a:prstGeom prst="rect">
+            <a:avLst/>
+          </a:prstGeom>
+          <a:ln w="12700">
+            <a:miter lim="400000"/>
+          </a:ln>
+          <a:extLst>
+            <a:ext uri="{C572A759-6A51-4108-AA02-DFA0A04FC94B}">
+              <ma14:wrappingTextBoxFlag xmlns:ma14="http://schemas.microsoft.com/office/mac/drawingml/2011/main" val="1"/>
+            </a:ext>
+          </a:extLst>
+        </p:spPr>
+        <p:txBody>
+          <a:bodyPr lIns="50800" tIns="50800" rIns="50800" bIns="50800">
+            <a:spAutoFit/>
+          </a:bodyPr>
+          <a:lstStyle>
+            <a:lvl1pPr defTabSz="12700">
+              <a:tabLst>
+                <a:tab pos="355600" algn="l"/>
+                <a:tab pos="711200" algn="l"/>
+                <a:tab pos="1066800" algn="l"/>
+                <a:tab pos="1422400" algn="l"/>
+                <a:tab pos="1778000" algn="l"/>
+                <a:tab pos="2133600" algn="l"/>
+                <a:tab pos="2489200" algn="l"/>
+                <a:tab pos="2844800" algn="l"/>
+                <a:tab pos="3200400" algn="l"/>
+                <a:tab pos="3556000" algn="l"/>
+                <a:tab pos="3911600" algn="l"/>
+                <a:tab pos="4267200" algn="l"/>
+              </a:tabLst>
+              <a:defRPr>
+                <a:solidFill>
+                  <a:srgbClr val="00CB9F"/>
+                </a:solidFill>
+                <a:latin typeface="+mn-lt"/>
+                <a:ea typeface="+mn-ea"/>
+                <a:cs typeface="+mn-cs"/>
+                <a:sym typeface="Ubuntu"/>
+              </a:defRPr>
+            </a:lvl1pPr>
+          </a:lstStyle>
+          <a:p>
+            <a:r>
+              <a:t>Team Up!</a:t>
+            </a:r>
+          </a:p>
+        </p:txBody>
+      </p:sp>
+      <p:sp>
+        <p:nvSpPr>
+          <p:cNvPr id="251" name="You have 90 minutes to analyse and improve a chosen open source software with the help of Gamma."/>
+          <p:cNvSpPr txBox="1"/>
+          <p:nvPr/>
+        </p:nvSpPr>
+        <p:spPr>
+          <a:xfrm>
+            <a:off x="6621792" y="8803847"/>
+            <a:ext cx="5153291" cy="1976835"/>
+          </a:xfrm>
+          <a:prstGeom prst="rect">
+            <a:avLst/>
+          </a:prstGeom>
+          <a:ln w="12700">
+            <a:miter lim="400000"/>
+          </a:ln>
+          <a:extLst>
+            <a:ext uri="{C572A759-6A51-4108-AA02-DFA0A04FC94B}">
+              <ma14:wrappingTextBoxFlag xmlns:ma14="http://schemas.microsoft.com/office/mac/drawingml/2011/main" val="1"/>
+            </a:ext>
+          </a:extLst>
+        </p:spPr>
+        <p:txBody>
+          <a:bodyPr lIns="50800" tIns="50800" rIns="50800" bIns="50800">
+            <a:normAutofit/>
+          </a:bodyPr>
+          <a:lstStyle>
+            <a:lvl1pPr algn="l">
+              <a:lnSpc>
+                <a:spcPct val="110000"/>
+              </a:lnSpc>
+              <a:spcBef>
+                <a:spcPts val="2000"/>
+              </a:spcBef>
+              <a:defRPr sz="2600" b="0">
+                <a:solidFill>
+                  <a:srgbClr val="3B444D"/>
+                </a:solidFill>
+                <a:latin typeface="+mn-lt"/>
+                <a:ea typeface="+mn-ea"/>
+                <a:cs typeface="+mn-cs"/>
+                <a:sym typeface="Ubuntu"/>
+              </a:defRPr>
+            </a:lvl1pPr>
+          </a:lstStyle>
+          <a:p>
+            <a:r>
+              <a:t>You have 90 minutes to analyse and improve a chosen open source software with the help of Gamma.</a:t>
+            </a:r>
+          </a:p>
+        </p:txBody>
+      </p:sp>
+      <p:sp>
+        <p:nvSpPr>
+          <p:cNvPr id="252" name="The team with the highest overall Gamma quality score wins."/>
+          <p:cNvSpPr txBox="1"/>
+          <p:nvPr/>
+        </p:nvSpPr>
+        <p:spPr>
+          <a:xfrm>
+            <a:off x="12275409" y="8803847"/>
+            <a:ext cx="5153291" cy="1976835"/>
+          </a:xfrm>
+          <a:prstGeom prst="rect">
+            <a:avLst/>
+          </a:prstGeom>
+          <a:ln w="12700">
+            <a:miter lim="400000"/>
+          </a:ln>
+          <a:extLst>
+            <a:ext uri="{C572A759-6A51-4108-AA02-DFA0A04FC94B}">
+              <ma14:wrappingTextBoxFlag xmlns:ma14="http://schemas.microsoft.com/office/mac/drawingml/2011/main" val="1"/>
+            </a:ext>
+          </a:extLst>
+        </p:spPr>
+        <p:txBody>
+          <a:bodyPr lIns="50800" tIns="50800" rIns="50800" bIns="50800">
+            <a:normAutofit/>
+          </a:bodyPr>
+          <a:lstStyle>
+            <a:lvl1pPr algn="l">
+              <a:lnSpc>
+                <a:spcPct val="110000"/>
+              </a:lnSpc>
+              <a:spcBef>
+                <a:spcPts val="2000"/>
+              </a:spcBef>
+              <a:defRPr sz="2600" b="0">
+                <a:solidFill>
+                  <a:srgbClr val="3B444D"/>
+                </a:solidFill>
+                <a:latin typeface="+mn-lt"/>
+                <a:ea typeface="+mn-ea"/>
+                <a:cs typeface="+mn-cs"/>
+                <a:sym typeface="Ubuntu"/>
+              </a:defRPr>
+            </a:lvl1pPr>
+          </a:lstStyle>
+          <a:p>
+            <a:r>
+              <a:t>The team with the highest overall Gamma quality score wins.</a:t>
+            </a:r>
+          </a:p>
+        </p:txBody>
+      </p:sp>
+      <p:sp>
+        <p:nvSpPr>
+          <p:cNvPr id="253" name="Winning team receives a €20 Amazon gift card (per person) and a Gamma T-shirt."/>
+          <p:cNvSpPr txBox="1"/>
+          <p:nvPr/>
+        </p:nvSpPr>
+        <p:spPr>
+          <a:xfrm>
+            <a:off x="17929026" y="8803847"/>
+            <a:ext cx="5153291" cy="1976835"/>
+          </a:xfrm>
+          <a:prstGeom prst="rect">
+            <a:avLst/>
+          </a:prstGeom>
+          <a:ln w="12700">
+            <a:miter lim="400000"/>
+          </a:ln>
+          <a:extLst>
+            <a:ext uri="{C572A759-6A51-4108-AA02-DFA0A04FC94B}">
+              <ma14:wrappingTextBoxFlag xmlns:ma14="http://schemas.microsoft.com/office/mac/drawingml/2011/main" val="1"/>
+            </a:ext>
+          </a:extLst>
+        </p:spPr>
+        <p:txBody>
+          <a:bodyPr lIns="50800" tIns="50800" rIns="50800" bIns="50800">
+            <a:normAutofit/>
+          </a:bodyPr>
+          <a:lstStyle>
+            <a:lvl1pPr algn="l">
+              <a:lnSpc>
+                <a:spcPct val="110000"/>
+              </a:lnSpc>
+              <a:spcBef>
+                <a:spcPts val="2000"/>
+              </a:spcBef>
+              <a:defRPr sz="2600" b="0">
+                <a:solidFill>
+                  <a:srgbClr val="3B444D"/>
+                </a:solidFill>
+                <a:latin typeface="+mn-lt"/>
+                <a:ea typeface="+mn-ea"/>
+                <a:cs typeface="+mn-cs"/>
+                <a:sym typeface="Ubuntu"/>
+              </a:defRPr>
+            </a:lvl1pPr>
+          </a:lstStyle>
+          <a:p>
+            <a:r>
+              <a:t>Winning team receives a €20 Amazon gift card (per person) and a Gamma T-shirt.</a:t>
+            </a:r>
+          </a:p>
+        </p:txBody>
+      </p:sp>
+    </p:spTree>
+  </p:cSld>
+  <p:clrMapOvr>
+    <a:masterClrMapping/>
+  </p:clrMapOvr>
+  <p:transition spd="med"/>
+</p:sld>
+</file>
+
 <file path=ppt/slides/slide4.xml><?xml version="1.0" encoding="utf-8"?>
 <p:sld xmlns:a="http://schemas.openxmlformats.org/drawingml/2006/main" xmlns:r="http://schemas.openxmlformats.org/officeDocument/2006/relationships" xmlns:p="http://schemas.openxmlformats.org/presentationml/2006/main">
   <p:cSld>
@@ -6143,7 +6148,7 @@
         </p:spPr>
         <p:txBody>
           <a:bodyPr>
-            <a:normAutofit/>
+            <a:normAutofit fontScale="90000"/>
           </a:bodyPr>
           <a:lstStyle>
             <a:lvl1pPr algn="ctr"/>

</xml_diff>